<commit_message>
done with lecture 9
</commit_message>
<xml_diff>
--- a/figures/pics for NMR lectures.pptx
+++ b/figures/pics for NMR lectures.pptx
@@ -5,7 +5,7 @@
     <p:sldMasterId id="2147483648" r:id="rId1"/>
   </p:sldMasterIdLst>
   <p:notesMasterIdLst>
-    <p:notesMasterId r:id="rId58"/>
+    <p:notesMasterId r:id="rId59"/>
   </p:notesMasterIdLst>
   <p:sldIdLst>
     <p:sldId id="257" r:id="rId2"/>
@@ -64,6 +64,7 @@
     <p:sldId id="309" r:id="rId55"/>
     <p:sldId id="311" r:id="rId56"/>
     <p:sldId id="312" r:id="rId57"/>
+    <p:sldId id="313" r:id="rId58"/>
   </p:sldIdLst>
   <p:sldSz cx="12192000" cy="6858000"/>
   <p:notesSz cx="6858000" cy="9144000"/>
@@ -227,6 +228,7 @@
             <p14:sldId id="309"/>
             <p14:sldId id="311"/>
             <p14:sldId id="312"/>
+            <p14:sldId id="313"/>
           </p14:sldIdLst>
         </p14:section>
       </p14:sectionLst>
@@ -320,7 +322,7 @@
           <a:p>
             <a:fld id="{D98A8B21-A5DE-4FDD-84FC-FB32FCF8106F}" type="datetimeFigureOut">
               <a:rPr lang="en-GB" smtClean="0"/>
-              <a:t>09/08/2017</a:t>
+              <a:t>10/08/2017</a:t>
             </a:fld>
             <a:endParaRPr lang="en-GB"/>
           </a:p>
@@ -756,6 +758,90 @@
 </p:notes>
 </file>
 
+<file path=ppt/notesSlides/notesSlide3.xml><?xml version="1.0" encoding="utf-8"?>
+<p:notes xmlns:a="http://schemas.openxmlformats.org/drawingml/2006/main" xmlns:r="http://schemas.openxmlformats.org/officeDocument/2006/relationships" xmlns:p="http://schemas.openxmlformats.org/presentationml/2006/main">
+  <p:cSld>
+    <p:spTree>
+      <p:nvGrpSpPr>
+        <p:cNvPr id="1" name=""/>
+        <p:cNvGrpSpPr/>
+        <p:nvPr/>
+      </p:nvGrpSpPr>
+      <p:grpSpPr>
+        <a:xfrm>
+          <a:off x="0" y="0"/>
+          <a:ext cx="0" cy="0"/>
+          <a:chOff x="0" y="0"/>
+          <a:chExt cx="0" cy="0"/>
+        </a:xfrm>
+      </p:grpSpPr>
+      <p:sp>
+        <p:nvSpPr>
+          <p:cNvPr id="2" name="Slide Image Placeholder 1"/>
+          <p:cNvSpPr>
+            <a:spLocks noGrp="1" noRot="1" noChangeAspect="1"/>
+          </p:cNvSpPr>
+          <p:nvPr>
+            <p:ph type="sldImg"/>
+          </p:nvPr>
+        </p:nvSpPr>
+        <p:spPr/>
+      </p:sp>
+      <p:sp>
+        <p:nvSpPr>
+          <p:cNvPr id="3" name="Notes Placeholder 2"/>
+          <p:cNvSpPr>
+            <a:spLocks noGrp="1"/>
+          </p:cNvSpPr>
+          <p:nvPr>
+            <p:ph type="body" idx="1"/>
+          </p:nvPr>
+        </p:nvSpPr>
+        <p:spPr/>
+        <p:txBody>
+          <a:bodyPr/>
+          <a:lstStyle/>
+          <a:p>
+            <a:endParaRPr lang="en-GB" dirty="0"/>
+          </a:p>
+        </p:txBody>
+      </p:sp>
+      <p:sp>
+        <p:nvSpPr>
+          <p:cNvPr id="4" name="Slide Number Placeholder 3"/>
+          <p:cNvSpPr>
+            <a:spLocks noGrp="1"/>
+          </p:cNvSpPr>
+          <p:nvPr>
+            <p:ph type="sldNum" sz="quarter" idx="10"/>
+          </p:nvPr>
+        </p:nvSpPr>
+        <p:spPr/>
+        <p:txBody>
+          <a:bodyPr/>
+          <a:lstStyle/>
+          <a:p>
+            <a:fld id="{442B8383-3B7B-40DA-BC53-FA10C7E8F4A7}" type="slidenum">
+              <a:rPr lang="en-GB" smtClean="0"/>
+              <a:t>56</a:t>
+            </a:fld>
+            <a:endParaRPr lang="en-GB"/>
+          </a:p>
+        </p:txBody>
+      </p:sp>
+    </p:spTree>
+    <p:extLst>
+      <p:ext uri="{BB962C8B-B14F-4D97-AF65-F5344CB8AC3E}">
+        <p14:creationId xmlns:p14="http://schemas.microsoft.com/office/powerpoint/2010/main" val="266093495"/>
+      </p:ext>
+    </p:extLst>
+  </p:cSld>
+  <p:clrMapOvr>
+    <a:masterClrMapping/>
+  </p:clrMapOvr>
+</p:notes>
+</file>
+
 <file path=ppt/slideLayouts/slideLayout1.xml><?xml version="1.0" encoding="utf-8"?>
 <p:sldLayout xmlns:a="http://schemas.openxmlformats.org/drawingml/2006/main" xmlns:r="http://schemas.openxmlformats.org/officeDocument/2006/relationships" xmlns:p="http://schemas.openxmlformats.org/presentationml/2006/main" type="title" preserve="1">
   <p:cSld name="Title Slide">
@@ -887,7 +973,7 @@
           <a:p>
             <a:fld id="{D31532C7-002A-42CF-8CCE-521F7F2F004A}" type="datetimeFigureOut">
               <a:rPr lang="en-GB" smtClean="0"/>
-              <a:t>09/08/2017</a:t>
+              <a:t>10/08/2017</a:t>
             </a:fld>
             <a:endParaRPr lang="en-GB"/>
           </a:p>
@@ -1057,7 +1143,7 @@
           <a:p>
             <a:fld id="{D31532C7-002A-42CF-8CCE-521F7F2F004A}" type="datetimeFigureOut">
               <a:rPr lang="en-GB" smtClean="0"/>
-              <a:t>09/08/2017</a:t>
+              <a:t>10/08/2017</a:t>
             </a:fld>
             <a:endParaRPr lang="en-GB"/>
           </a:p>
@@ -1237,7 +1323,7 @@
           <a:p>
             <a:fld id="{D31532C7-002A-42CF-8CCE-521F7F2F004A}" type="datetimeFigureOut">
               <a:rPr lang="en-GB" smtClean="0"/>
-              <a:t>09/08/2017</a:t>
+              <a:t>10/08/2017</a:t>
             </a:fld>
             <a:endParaRPr lang="en-GB"/>
           </a:p>
@@ -1407,7 +1493,7 @@
           <a:p>
             <a:fld id="{D31532C7-002A-42CF-8CCE-521F7F2F004A}" type="datetimeFigureOut">
               <a:rPr lang="en-GB" smtClean="0"/>
-              <a:t>09/08/2017</a:t>
+              <a:t>10/08/2017</a:t>
             </a:fld>
             <a:endParaRPr lang="en-GB"/>
           </a:p>
@@ -1653,7 +1739,7 @@
           <a:p>
             <a:fld id="{D31532C7-002A-42CF-8CCE-521F7F2F004A}" type="datetimeFigureOut">
               <a:rPr lang="en-GB" smtClean="0"/>
-              <a:t>09/08/2017</a:t>
+              <a:t>10/08/2017</a:t>
             </a:fld>
             <a:endParaRPr lang="en-GB"/>
           </a:p>
@@ -1885,7 +1971,7 @@
           <a:p>
             <a:fld id="{D31532C7-002A-42CF-8CCE-521F7F2F004A}" type="datetimeFigureOut">
               <a:rPr lang="en-GB" smtClean="0"/>
-              <a:t>09/08/2017</a:t>
+              <a:t>10/08/2017</a:t>
             </a:fld>
             <a:endParaRPr lang="en-GB"/>
           </a:p>
@@ -2252,7 +2338,7 @@
           <a:p>
             <a:fld id="{D31532C7-002A-42CF-8CCE-521F7F2F004A}" type="datetimeFigureOut">
               <a:rPr lang="en-GB" smtClean="0"/>
-              <a:t>09/08/2017</a:t>
+              <a:t>10/08/2017</a:t>
             </a:fld>
             <a:endParaRPr lang="en-GB"/>
           </a:p>
@@ -2370,7 +2456,7 @@
           <a:p>
             <a:fld id="{D31532C7-002A-42CF-8CCE-521F7F2F004A}" type="datetimeFigureOut">
               <a:rPr lang="en-GB" smtClean="0"/>
-              <a:t>09/08/2017</a:t>
+              <a:t>10/08/2017</a:t>
             </a:fld>
             <a:endParaRPr lang="en-GB"/>
           </a:p>
@@ -2465,7 +2551,7 @@
           <a:p>
             <a:fld id="{D31532C7-002A-42CF-8CCE-521F7F2F004A}" type="datetimeFigureOut">
               <a:rPr lang="en-GB" smtClean="0"/>
-              <a:t>09/08/2017</a:t>
+              <a:t>10/08/2017</a:t>
             </a:fld>
             <a:endParaRPr lang="en-GB"/>
           </a:p>
@@ -2742,7 +2828,7 @@
           <a:p>
             <a:fld id="{D31532C7-002A-42CF-8CCE-521F7F2F004A}" type="datetimeFigureOut">
               <a:rPr lang="en-GB" smtClean="0"/>
-              <a:t>09/08/2017</a:t>
+              <a:t>10/08/2017</a:t>
             </a:fld>
             <a:endParaRPr lang="en-GB"/>
           </a:p>
@@ -2995,7 +3081,7 @@
           <a:p>
             <a:fld id="{D31532C7-002A-42CF-8CCE-521F7F2F004A}" type="datetimeFigureOut">
               <a:rPr lang="en-GB" smtClean="0"/>
-              <a:t>09/08/2017</a:t>
+              <a:t>10/08/2017</a:t>
             </a:fld>
             <a:endParaRPr lang="en-GB"/>
           </a:p>
@@ -3208,7 +3294,7 @@
           <a:p>
             <a:fld id="{D31532C7-002A-42CF-8CCE-521F7F2F004A}" type="datetimeFigureOut">
               <a:rPr lang="en-GB" smtClean="0"/>
-              <a:t>09/08/2017</a:t>
+              <a:t>10/08/2017</a:t>
             </a:fld>
             <a:endParaRPr lang="en-GB"/>
           </a:p>
@@ -31206,6 +31292,13 @@
   <p:clrMapOvr>
     <a:masterClrMapping/>
   </p:clrMapOvr>
+  <p:timing>
+    <p:tnLst>
+      <p:par>
+        <p:cTn id="1" dur="indefinite" restart="never" nodeType="tmRoot"/>
+      </p:par>
+    </p:tnLst>
+  </p:timing>
 </p:sld>
 </file>
 
@@ -42788,6 +42881,13 @@
   <p:clrMapOvr>
     <a:masterClrMapping/>
   </p:clrMapOvr>
+  <p:timing>
+    <p:tnLst>
+      <p:par>
+        <p:cTn id="1" dur="indefinite" restart="never" nodeType="tmRoot"/>
+      </p:par>
+    </p:tnLst>
+  </p:timing>
 </p:sld>
 </file>
 
@@ -42882,7 +42982,7 @@
               <a:graphicData uri="http://schemas.openxmlformats.org/presentationml/2006/ole">
                 <mc:AlternateContent xmlns:mc="http://schemas.openxmlformats.org/markup-compatibility/2006">
                   <mc:Choice xmlns:v="urn:schemas-microsoft-com:vml" Requires="v">
-                    <p:oleObj spid="_x0000_s2086" name="CS ChemDraw Drawing" r:id="rId4" imgW="4169232" imgH="830250" progId="ChemDraw.Document.6.0">
+                    <p:oleObj spid="_x0000_s2096" name="CS ChemDraw Drawing" r:id="rId4" imgW="4169232" imgH="830250" progId="ChemDraw.Document.6.0">
                       <p:embed/>
                     </p:oleObj>
                   </mc:Choice>
@@ -43075,7 +43175,7 @@
             <a:graphicData uri="http://schemas.openxmlformats.org/presentationml/2006/ole">
               <mc:AlternateContent xmlns:mc="http://schemas.openxmlformats.org/markup-compatibility/2006">
                 <mc:Choice xmlns:v="urn:schemas-microsoft-com:vml" Requires="v">
-                  <p:oleObj spid="_x0000_s1069" name="CS ChemDraw Drawing" r:id="rId3" imgW="4169232" imgH="830250" progId="ChemDraw.Document.6.0">
+                  <p:oleObj spid="_x0000_s1079" name="CS ChemDraw Drawing" r:id="rId3" imgW="4169232" imgH="830250" progId="ChemDraw.Document.6.0">
                     <p:embed/>
                   </p:oleObj>
                 </mc:Choice>
@@ -44441,14 +44541,7 @@
                   <a:latin typeface="Arial" panose="020B0604020202020204" pitchFamily="34" charset="0"/>
                   <a:cs typeface="Arial" panose="020B0604020202020204" pitchFamily="34" charset="0"/>
                 </a:rPr>
-                <a:t>|2&gt;=</a:t>
-              </a:r>
-              <a:r>
-                <a:rPr lang="en-GB" sz="3200" dirty="0" smtClean="0">
-                  <a:latin typeface="Arial" panose="020B0604020202020204" pitchFamily="34" charset="0"/>
-                  <a:cs typeface="Arial" panose="020B0604020202020204" pitchFamily="34" charset="0"/>
-                </a:rPr>
-                <a:t>|</a:t>
+                <a:t>|2&gt;=|</a:t>
               </a:r>
               <a:r>
                 <a:rPr lang="en-GB" sz="3200" dirty="0" smtClean="0">
@@ -44593,14 +44686,7 @@
                   <a:latin typeface="Arial" panose="020B0604020202020204" pitchFamily="34" charset="0"/>
                   <a:cs typeface="Arial" panose="020B0604020202020204" pitchFamily="34" charset="0"/>
                 </a:rPr>
-                <a:t>|1&gt;=</a:t>
-              </a:r>
-              <a:r>
-                <a:rPr lang="en-GB" sz="3200" dirty="0" smtClean="0">
-                  <a:latin typeface="Arial" panose="020B0604020202020204" pitchFamily="34" charset="0"/>
-                  <a:cs typeface="Arial" panose="020B0604020202020204" pitchFamily="34" charset="0"/>
-                </a:rPr>
-                <a:t>|</a:t>
+                <a:t>|1&gt;=|</a:t>
               </a:r>
               <a:r>
                 <a:rPr lang="en-GB" sz="3200" dirty="0" smtClean="0">
@@ -44649,14 +44735,7 @@
                   <a:latin typeface="Arial" panose="020B0604020202020204" pitchFamily="34" charset="0"/>
                   <a:cs typeface="Arial" panose="020B0604020202020204" pitchFamily="34" charset="0"/>
                 </a:rPr>
-                <a:t>|4&gt;=</a:t>
-              </a:r>
-              <a:r>
-                <a:rPr lang="en-GB" sz="3200" dirty="0" smtClean="0">
-                  <a:latin typeface="Arial" panose="020B0604020202020204" pitchFamily="34" charset="0"/>
-                  <a:cs typeface="Arial" panose="020B0604020202020204" pitchFamily="34" charset="0"/>
-                </a:rPr>
-                <a:t>|</a:t>
+                <a:t>|4&gt;=|</a:t>
               </a:r>
               <a:r>
                 <a:rPr lang="en-GB" sz="3200" dirty="0" smtClean="0">
@@ -44705,14 +44784,7 @@
                   <a:latin typeface="Arial" panose="020B0604020202020204" pitchFamily="34" charset="0"/>
                   <a:cs typeface="Arial" panose="020B0604020202020204" pitchFamily="34" charset="0"/>
                 </a:rPr>
-                <a:t>|3&gt;=</a:t>
-              </a:r>
-              <a:r>
-                <a:rPr lang="en-GB" sz="3200" dirty="0" smtClean="0">
-                  <a:latin typeface="Arial" panose="020B0604020202020204" pitchFamily="34" charset="0"/>
-                  <a:cs typeface="Arial" panose="020B0604020202020204" pitchFamily="34" charset="0"/>
-                </a:rPr>
-                <a:t>|</a:t>
+                <a:t>|3&gt;=|</a:t>
               </a:r>
               <a:r>
                 <a:rPr lang="en-GB" sz="3200" dirty="0" err="1" smtClean="0">
@@ -45175,10 +45247,1136 @@
   <p:clrMapOvr>
     <a:masterClrMapping/>
   </p:clrMapOvr>
+  <p:timing>
+    <p:tnLst>
+      <p:par>
+        <p:cTn id="1" dur="indefinite" restart="never" nodeType="tmRoot"/>
+      </p:par>
+    </p:tnLst>
+  </p:timing>
 </p:sld>
 </file>
 
 <file path=ppt/slides/slide56.xml><?xml version="1.0" encoding="utf-8"?>
+<p:sld xmlns:a="http://schemas.openxmlformats.org/drawingml/2006/main" xmlns:r="http://schemas.openxmlformats.org/officeDocument/2006/relationships" xmlns:p="http://schemas.openxmlformats.org/presentationml/2006/main">
+  <p:cSld>
+    <p:spTree>
+      <p:nvGrpSpPr>
+        <p:cNvPr id="1" name=""/>
+        <p:cNvGrpSpPr/>
+        <p:nvPr/>
+      </p:nvGrpSpPr>
+      <p:grpSpPr>
+        <a:xfrm>
+          <a:off x="0" y="0"/>
+          <a:ext cx="0" cy="0"/>
+          <a:chOff x="0" y="0"/>
+          <a:chExt cx="0" cy="0"/>
+        </a:xfrm>
+      </p:grpSpPr>
+      <p:grpSp>
+        <p:nvGrpSpPr>
+          <p:cNvPr id="29" name="Group 28"/>
+          <p:cNvGrpSpPr/>
+          <p:nvPr/>
+        </p:nvGrpSpPr>
+        <p:grpSpPr>
+          <a:xfrm>
+            <a:off x="143485" y="602619"/>
+            <a:ext cx="11719902" cy="6154709"/>
+            <a:chOff x="143485" y="602619"/>
+            <a:chExt cx="11719902" cy="6154709"/>
+          </a:xfrm>
+        </p:grpSpPr>
+        <p:grpSp>
+          <p:nvGrpSpPr>
+            <p:cNvPr id="7" name="Group 6"/>
+            <p:cNvGrpSpPr/>
+            <p:nvPr/>
+          </p:nvGrpSpPr>
+          <p:grpSpPr>
+            <a:xfrm>
+              <a:off x="143485" y="602619"/>
+              <a:ext cx="11719902" cy="6154709"/>
+              <a:chOff x="272073" y="288294"/>
+              <a:chExt cx="11719902" cy="6154709"/>
+            </a:xfrm>
+          </p:grpSpPr>
+          <p:pic>
+            <p:nvPicPr>
+              <p:cNvPr id="4" name="Picture 3"/>
+              <p:cNvPicPr>
+                <a:picLocks noChangeAspect="1"/>
+              </p:cNvPicPr>
+              <p:nvPr/>
+            </p:nvPicPr>
+            <p:blipFill>
+              <a:blip r:embed="rId3" cstate="print">
+                <a:extLst>
+                  <a:ext uri="{28A0092B-C50C-407E-A947-70E740481C1C}">
+                    <a14:useLocalDpi xmlns:a14="http://schemas.microsoft.com/office/drawing/2010/main" val="0"/>
+                  </a:ext>
+                </a:extLst>
+              </a:blip>
+              <a:stretch>
+                <a:fillRect/>
+              </a:stretch>
+            </p:blipFill>
+            <p:spPr>
+              <a:xfrm>
+                <a:off x="272073" y="288294"/>
+                <a:ext cx="6675106" cy="6154709"/>
+              </a:xfrm>
+              <a:prstGeom prst="rect">
+                <a:avLst/>
+              </a:prstGeom>
+            </p:spPr>
+          </p:pic>
+          <p:pic>
+            <p:nvPicPr>
+              <p:cNvPr id="3" name="Picture 2"/>
+              <p:cNvPicPr>
+                <a:picLocks noChangeAspect="1"/>
+              </p:cNvPicPr>
+              <p:nvPr/>
+            </p:nvPicPr>
+            <p:blipFill>
+              <a:blip r:embed="rId4">
+                <a:extLst>
+                  <a:ext uri="{28A0092B-C50C-407E-A947-70E740481C1C}">
+                    <a14:useLocalDpi xmlns:a14="http://schemas.microsoft.com/office/drawing/2010/main" val="0"/>
+                  </a:ext>
+                </a:extLst>
+              </a:blip>
+              <a:stretch>
+                <a:fillRect/>
+              </a:stretch>
+            </p:blipFill>
+            <p:spPr>
+              <a:xfrm>
+                <a:off x="7183501" y="2131255"/>
+                <a:ext cx="4808474" cy="4079631"/>
+              </a:xfrm>
+              <a:prstGeom prst="rect">
+                <a:avLst/>
+              </a:prstGeom>
+            </p:spPr>
+          </p:pic>
+          <p:sp>
+            <p:nvSpPr>
+              <p:cNvPr id="5" name="Oval 4"/>
+              <p:cNvSpPr/>
+              <p:nvPr/>
+            </p:nvSpPr>
+            <p:spPr>
+              <a:xfrm>
+                <a:off x="2321169" y="4037428"/>
+                <a:ext cx="225083" cy="267286"/>
+              </a:xfrm>
+              <a:prstGeom prst="ellipse">
+                <a:avLst/>
+              </a:prstGeom>
+              <a:noFill/>
+              <a:ln w="31750">
+                <a:solidFill>
+                  <a:srgbClr val="FF0000"/>
+                </a:solidFill>
+                <a:prstDash val="sysDot"/>
+              </a:ln>
+            </p:spPr>
+            <p:style>
+              <a:lnRef idx="2">
+                <a:schemeClr val="accent1">
+                  <a:shade val="50000"/>
+                </a:schemeClr>
+              </a:lnRef>
+              <a:fillRef idx="1">
+                <a:schemeClr val="accent1"/>
+              </a:fillRef>
+              <a:effectRef idx="0">
+                <a:schemeClr val="accent1"/>
+              </a:effectRef>
+              <a:fontRef idx="minor">
+                <a:schemeClr val="lt1"/>
+              </a:fontRef>
+            </p:style>
+            <p:txBody>
+              <a:bodyPr rtlCol="0" anchor="ctr"/>
+              <a:lstStyle/>
+              <a:p>
+                <a:pPr algn="ctr"/>
+                <a:endParaRPr lang="en-GB"/>
+              </a:p>
+            </p:txBody>
+          </p:sp>
+          <p:sp>
+            <p:nvSpPr>
+              <p:cNvPr id="6" name="Oval 5"/>
+              <p:cNvSpPr/>
+              <p:nvPr/>
+            </p:nvSpPr>
+            <p:spPr>
+              <a:xfrm>
+                <a:off x="2061920" y="1603790"/>
+                <a:ext cx="225083" cy="267286"/>
+              </a:xfrm>
+              <a:prstGeom prst="ellipse">
+                <a:avLst/>
+              </a:prstGeom>
+              <a:noFill/>
+              <a:ln w="31750">
+                <a:solidFill>
+                  <a:srgbClr val="FF0000"/>
+                </a:solidFill>
+                <a:prstDash val="sysDot"/>
+              </a:ln>
+            </p:spPr>
+            <p:style>
+              <a:lnRef idx="2">
+                <a:schemeClr val="accent1">
+                  <a:shade val="50000"/>
+                </a:schemeClr>
+              </a:lnRef>
+              <a:fillRef idx="1">
+                <a:schemeClr val="accent1"/>
+              </a:fillRef>
+              <a:effectRef idx="0">
+                <a:schemeClr val="accent1"/>
+              </a:effectRef>
+              <a:fontRef idx="minor">
+                <a:schemeClr val="lt1"/>
+              </a:fontRef>
+            </p:style>
+            <p:txBody>
+              <a:bodyPr rtlCol="0" anchor="ctr"/>
+              <a:lstStyle/>
+              <a:p>
+                <a:pPr algn="ctr"/>
+                <a:endParaRPr lang="en-GB"/>
+              </a:p>
+            </p:txBody>
+          </p:sp>
+        </p:grpSp>
+        <p:grpSp>
+          <p:nvGrpSpPr>
+            <p:cNvPr id="8" name="Group 7"/>
+            <p:cNvGrpSpPr/>
+            <p:nvPr/>
+          </p:nvGrpSpPr>
+          <p:grpSpPr>
+            <a:xfrm>
+              <a:off x="6951024" y="962393"/>
+              <a:ext cx="4750151" cy="1665921"/>
+              <a:chOff x="1676049" y="711218"/>
+              <a:chExt cx="4750151" cy="1665921"/>
+            </a:xfrm>
+          </p:grpSpPr>
+          <p:grpSp>
+            <p:nvGrpSpPr>
+              <p:cNvPr id="9" name="Group 8"/>
+              <p:cNvGrpSpPr/>
+              <p:nvPr/>
+            </p:nvGrpSpPr>
+            <p:grpSpPr>
+              <a:xfrm>
+                <a:off x="1741714" y="974681"/>
+                <a:ext cx="4684486" cy="1402458"/>
+                <a:chOff x="1741714" y="974681"/>
+                <a:chExt cx="4684486" cy="1402458"/>
+              </a:xfrm>
+            </p:grpSpPr>
+            <p:grpSp>
+              <p:nvGrpSpPr>
+                <p:cNvPr id="17" name="Group 16"/>
+                <p:cNvGrpSpPr/>
+                <p:nvPr/>
+              </p:nvGrpSpPr>
+              <p:grpSpPr>
+                <a:xfrm>
+                  <a:off x="1741714" y="1062039"/>
+                  <a:ext cx="4684486" cy="1086076"/>
+                  <a:chOff x="1741714" y="1597025"/>
+                  <a:chExt cx="3126811" cy="551089"/>
+                </a:xfrm>
+              </p:grpSpPr>
+              <p:cxnSp>
+                <p:nvCxnSpPr>
+                  <p:cNvPr id="27" name="Straight Connector 26"/>
+                  <p:cNvCxnSpPr/>
+                  <p:nvPr/>
+                </p:nvCxnSpPr>
+                <p:spPr>
+                  <a:xfrm flipV="1">
+                    <a:off x="1741714" y="2146299"/>
+                    <a:ext cx="3126811" cy="1815"/>
+                  </a:xfrm>
+                  <a:prstGeom prst="line">
+                    <a:avLst/>
+                  </a:prstGeom>
+                  <a:ln cap="rnd">
+                    <a:tailEnd type="triangle"/>
+                  </a:ln>
+                </p:spPr>
+                <p:style>
+                  <a:lnRef idx="3">
+                    <a:schemeClr val="dk1"/>
+                  </a:lnRef>
+                  <a:fillRef idx="0">
+                    <a:schemeClr val="dk1"/>
+                  </a:fillRef>
+                  <a:effectRef idx="2">
+                    <a:schemeClr val="dk1"/>
+                  </a:effectRef>
+                  <a:fontRef idx="minor">
+                    <a:schemeClr val="tx1"/>
+                  </a:fontRef>
+                </p:style>
+              </p:cxnSp>
+              <p:sp>
+                <p:nvSpPr>
+                  <p:cNvPr id="28" name="Rectangle 27"/>
+                  <p:cNvSpPr/>
+                  <p:nvPr/>
+                </p:nvSpPr>
+                <p:spPr>
+                  <a:xfrm>
+                    <a:off x="1924050" y="1597025"/>
+                    <a:ext cx="82420" cy="549275"/>
+                  </a:xfrm>
+                  <a:prstGeom prst="rect">
+                    <a:avLst/>
+                  </a:prstGeom>
+                  <a:ln>
+                    <a:solidFill>
+                      <a:schemeClr val="tx1"/>
+                    </a:solidFill>
+                  </a:ln>
+                </p:spPr>
+                <p:style>
+                  <a:lnRef idx="2">
+                    <a:schemeClr val="dk1">
+                      <a:shade val="50000"/>
+                    </a:schemeClr>
+                  </a:lnRef>
+                  <a:fillRef idx="1">
+                    <a:schemeClr val="dk1"/>
+                  </a:fillRef>
+                  <a:effectRef idx="0">
+                    <a:schemeClr val="dk1"/>
+                  </a:effectRef>
+                  <a:fontRef idx="minor">
+                    <a:schemeClr val="lt1"/>
+                  </a:fontRef>
+                </p:style>
+                <p:txBody>
+                  <a:bodyPr rtlCol="0" anchor="ctr"/>
+                  <a:lstStyle/>
+                  <a:p>
+                    <a:pPr algn="ctr"/>
+                    <a:endParaRPr lang="en-GB"/>
+                  </a:p>
+                </p:txBody>
+              </p:sp>
+            </p:grpSp>
+            <p:sp>
+              <p:nvSpPr>
+                <p:cNvPr id="18" name="Rectangle 17"/>
+                <p:cNvSpPr/>
+                <p:nvPr/>
+              </p:nvSpPr>
+              <p:spPr>
+                <a:xfrm>
+                  <a:off x="2834034" y="1062038"/>
+                  <a:ext cx="123479" cy="1082501"/>
+                </a:xfrm>
+                <a:prstGeom prst="rect">
+                  <a:avLst/>
+                </a:prstGeom>
+                <a:ln>
+                  <a:solidFill>
+                    <a:schemeClr val="tx1"/>
+                  </a:solidFill>
+                </a:ln>
+              </p:spPr>
+              <p:style>
+                <a:lnRef idx="2">
+                  <a:schemeClr val="dk1">
+                    <a:shade val="50000"/>
+                  </a:schemeClr>
+                </a:lnRef>
+                <a:fillRef idx="1">
+                  <a:schemeClr val="dk1"/>
+                </a:fillRef>
+                <a:effectRef idx="0">
+                  <a:schemeClr val="dk1"/>
+                </a:effectRef>
+                <a:fontRef idx="minor">
+                  <a:schemeClr val="lt1"/>
+                </a:fontRef>
+              </p:style>
+              <p:txBody>
+                <a:bodyPr rtlCol="0" anchor="ctr"/>
+                <a:lstStyle/>
+                <a:p>
+                  <a:pPr algn="ctr"/>
+                  <a:endParaRPr lang="en-GB"/>
+                </a:p>
+              </p:txBody>
+            </p:sp>
+            <p:sp>
+              <p:nvSpPr>
+                <p:cNvPr id="19" name="Rectangle 18"/>
+                <p:cNvSpPr/>
+                <p:nvPr/>
+              </p:nvSpPr>
+              <p:spPr>
+                <a:xfrm>
+                  <a:off x="4920009" y="1062038"/>
+                  <a:ext cx="123479" cy="1082501"/>
+                </a:xfrm>
+                <a:prstGeom prst="rect">
+                  <a:avLst/>
+                </a:prstGeom>
+                <a:ln>
+                  <a:solidFill>
+                    <a:schemeClr val="tx1"/>
+                  </a:solidFill>
+                </a:ln>
+              </p:spPr>
+              <p:style>
+                <a:lnRef idx="2">
+                  <a:schemeClr val="dk1">
+                    <a:shade val="50000"/>
+                  </a:schemeClr>
+                </a:lnRef>
+                <a:fillRef idx="1">
+                  <a:schemeClr val="dk1"/>
+                </a:fillRef>
+                <a:effectRef idx="0">
+                  <a:schemeClr val="dk1"/>
+                </a:effectRef>
+                <a:fontRef idx="minor">
+                  <a:schemeClr val="lt1"/>
+                </a:fontRef>
+              </p:style>
+              <p:txBody>
+                <a:bodyPr rtlCol="0" anchor="ctr"/>
+                <a:lstStyle/>
+                <a:p>
+                  <a:pPr algn="ctr"/>
+                  <a:endParaRPr lang="en-GB"/>
+                </a:p>
+              </p:txBody>
+            </p:sp>
+            <p:cxnSp>
+              <p:nvCxnSpPr>
+                <p:cNvPr id="20" name="Straight Arrow Connector 19"/>
+                <p:cNvCxnSpPr/>
+                <p:nvPr/>
+              </p:nvCxnSpPr>
+              <p:spPr>
+                <a:xfrm>
+                  <a:off x="2166938" y="1347790"/>
+                  <a:ext cx="655191" cy="0"/>
+                </a:xfrm>
+                <a:prstGeom prst="straightConnector1">
+                  <a:avLst/>
+                </a:prstGeom>
+                <a:ln>
+                  <a:solidFill>
+                    <a:schemeClr val="tx1"/>
+                  </a:solidFill>
+                  <a:tailEnd type="triangle"/>
+                </a:ln>
+              </p:spPr>
+              <p:style>
+                <a:lnRef idx="1">
+                  <a:schemeClr val="accent1"/>
+                </a:lnRef>
+                <a:fillRef idx="0">
+                  <a:schemeClr val="accent1"/>
+                </a:fillRef>
+                <a:effectRef idx="0">
+                  <a:schemeClr val="accent1"/>
+                </a:effectRef>
+                <a:fontRef idx="minor">
+                  <a:schemeClr val="tx1"/>
+                </a:fontRef>
+              </p:style>
+            </p:cxnSp>
+            <p:sp>
+              <p:nvSpPr>
+                <p:cNvPr id="21" name="TextBox 20"/>
+                <p:cNvSpPr txBox="1"/>
+                <p:nvPr/>
+              </p:nvSpPr>
+              <p:spPr>
+                <a:xfrm>
+                  <a:off x="3853959" y="974681"/>
+                  <a:ext cx="285656" cy="369332"/>
+                </a:xfrm>
+                <a:prstGeom prst="rect">
+                  <a:avLst/>
+                </a:prstGeom>
+                <a:noFill/>
+              </p:spPr>
+              <p:txBody>
+                <a:bodyPr wrap="none" rtlCol="0">
+                  <a:spAutoFit/>
+                </a:bodyPr>
+                <a:lstStyle/>
+                <a:p>
+                  <a:r>
+                    <a:rPr lang="en-GB" dirty="0" smtClean="0">
+                      <a:latin typeface="Symbol" panose="05050102010706020507" pitchFamily="18" charset="2"/>
+                      <a:cs typeface="Arial" panose="020B0604020202020204" pitchFamily="34" charset="0"/>
+                    </a:rPr>
+                    <a:t>t</a:t>
+                  </a:r>
+                  <a:endParaRPr lang="en-GB" baseline="-25000" dirty="0">
+                    <a:latin typeface="Symbol" panose="05050102010706020507" pitchFamily="18" charset="2"/>
+                    <a:cs typeface="Arial" panose="020B0604020202020204" pitchFamily="34" charset="0"/>
+                  </a:endParaRPr>
+                </a:p>
+              </p:txBody>
+            </p:sp>
+            <p:cxnSp>
+              <p:nvCxnSpPr>
+                <p:cNvPr id="22" name="Straight Arrow Connector 21"/>
+                <p:cNvCxnSpPr/>
+                <p:nvPr/>
+              </p:nvCxnSpPr>
+              <p:spPr>
+                <a:xfrm>
+                  <a:off x="2987573" y="1347790"/>
+                  <a:ext cx="1905896" cy="0"/>
+                </a:xfrm>
+                <a:prstGeom prst="straightConnector1">
+                  <a:avLst/>
+                </a:prstGeom>
+                <a:ln>
+                  <a:solidFill>
+                    <a:schemeClr val="tx1"/>
+                  </a:solidFill>
+                  <a:headEnd type="triangle"/>
+                  <a:tailEnd type="triangle"/>
+                </a:ln>
+              </p:spPr>
+              <p:style>
+                <a:lnRef idx="1">
+                  <a:schemeClr val="accent1"/>
+                </a:lnRef>
+                <a:fillRef idx="0">
+                  <a:schemeClr val="accent1"/>
+                </a:fillRef>
+                <a:effectRef idx="0">
+                  <a:schemeClr val="accent1"/>
+                </a:effectRef>
+                <a:fontRef idx="minor">
+                  <a:schemeClr val="tx1"/>
+                </a:fontRef>
+              </p:style>
+            </p:cxnSp>
+            <p:cxnSp>
+              <p:nvCxnSpPr>
+                <p:cNvPr id="23" name="Straight Arrow Connector 22"/>
+                <p:cNvCxnSpPr/>
+                <p:nvPr/>
+              </p:nvCxnSpPr>
+              <p:spPr>
+                <a:xfrm>
+                  <a:off x="5075426" y="1344013"/>
+                  <a:ext cx="655191" cy="0"/>
+                </a:xfrm>
+                <a:prstGeom prst="straightConnector1">
+                  <a:avLst/>
+                </a:prstGeom>
+                <a:ln>
+                  <a:solidFill>
+                    <a:schemeClr val="tx1"/>
+                  </a:solidFill>
+                  <a:tailEnd type="triangle"/>
+                </a:ln>
+              </p:spPr>
+              <p:style>
+                <a:lnRef idx="1">
+                  <a:schemeClr val="accent1"/>
+                </a:lnRef>
+                <a:fillRef idx="0">
+                  <a:schemeClr val="accent1"/>
+                </a:fillRef>
+                <a:effectRef idx="0">
+                  <a:schemeClr val="accent1"/>
+                </a:effectRef>
+                <a:fontRef idx="minor">
+                  <a:schemeClr val="tx1"/>
+                </a:fontRef>
+              </p:style>
+            </p:cxnSp>
+            <p:sp>
+              <p:nvSpPr>
+                <p:cNvPr id="24" name="TextBox 23"/>
+                <p:cNvSpPr txBox="1"/>
+                <p:nvPr/>
+              </p:nvSpPr>
+              <p:spPr>
+                <a:xfrm>
+                  <a:off x="5208402" y="974681"/>
+                  <a:ext cx="333746" cy="369332"/>
+                </a:xfrm>
+                <a:prstGeom prst="rect">
+                  <a:avLst/>
+                </a:prstGeom>
+                <a:noFill/>
+              </p:spPr>
+              <p:txBody>
+                <a:bodyPr wrap="none" rtlCol="0">
+                  <a:spAutoFit/>
+                </a:bodyPr>
+                <a:lstStyle/>
+                <a:p>
+                  <a:r>
+                    <a:rPr lang="en-GB" dirty="0" smtClean="0">
+                      <a:latin typeface="Arial" panose="020B0604020202020204" pitchFamily="34" charset="0"/>
+                      <a:cs typeface="Arial" panose="020B0604020202020204" pitchFamily="34" charset="0"/>
+                    </a:rPr>
+                    <a:t>t</a:t>
+                  </a:r>
+                  <a:r>
+                    <a:rPr lang="en-GB" baseline="-25000" dirty="0" smtClean="0">
+                      <a:latin typeface="Arial" panose="020B0604020202020204" pitchFamily="34" charset="0"/>
+                      <a:cs typeface="Arial" panose="020B0604020202020204" pitchFamily="34" charset="0"/>
+                    </a:rPr>
+                    <a:t>2</a:t>
+                  </a:r>
+                  <a:endParaRPr lang="en-GB" baseline="-25000" dirty="0">
+                    <a:latin typeface="Arial" panose="020B0604020202020204" pitchFamily="34" charset="0"/>
+                    <a:cs typeface="Arial" panose="020B0604020202020204" pitchFamily="34" charset="0"/>
+                  </a:endParaRPr>
+                </a:p>
+              </p:txBody>
+            </p:sp>
+            <p:sp>
+              <p:nvSpPr>
+                <p:cNvPr id="25" name="Freeform 24"/>
+                <p:cNvSpPr/>
+                <p:nvPr/>
+              </p:nvSpPr>
+              <p:spPr>
+                <a:xfrm>
+                  <a:off x="5016500" y="1060450"/>
+                  <a:ext cx="990600" cy="1316689"/>
+                </a:xfrm>
+                <a:custGeom>
+                  <a:avLst/>
+                  <a:gdLst>
+                    <a:gd name="connsiteX0" fmla="*/ 0 w 990600"/>
+                    <a:gd name="connsiteY0" fmla="*/ 0 h 1316689"/>
+                    <a:gd name="connsiteX1" fmla="*/ 215900 w 990600"/>
+                    <a:gd name="connsiteY1" fmla="*/ 1295400 h 1316689"/>
+                    <a:gd name="connsiteX2" fmla="*/ 298450 w 990600"/>
+                    <a:gd name="connsiteY2" fmla="*/ 831850 h 1316689"/>
+                    <a:gd name="connsiteX3" fmla="*/ 431800 w 990600"/>
+                    <a:gd name="connsiteY3" fmla="*/ 1181100 h 1316689"/>
+                    <a:gd name="connsiteX4" fmla="*/ 571500 w 990600"/>
+                    <a:gd name="connsiteY4" fmla="*/ 977900 h 1316689"/>
+                    <a:gd name="connsiteX5" fmla="*/ 635000 w 990600"/>
+                    <a:gd name="connsiteY5" fmla="*/ 1136650 h 1316689"/>
+                    <a:gd name="connsiteX6" fmla="*/ 838200 w 990600"/>
+                    <a:gd name="connsiteY6" fmla="*/ 1047750 h 1316689"/>
+                    <a:gd name="connsiteX7" fmla="*/ 990600 w 990600"/>
+                    <a:gd name="connsiteY7" fmla="*/ 1085850 h 1316689"/>
+                  </a:gdLst>
+                  <a:ahLst/>
+                  <a:cxnLst>
+                    <a:cxn ang="0">
+                      <a:pos x="connsiteX0" y="connsiteY0"/>
+                    </a:cxn>
+                    <a:cxn ang="0">
+                      <a:pos x="connsiteX1" y="connsiteY1"/>
+                    </a:cxn>
+                    <a:cxn ang="0">
+                      <a:pos x="connsiteX2" y="connsiteY2"/>
+                    </a:cxn>
+                    <a:cxn ang="0">
+                      <a:pos x="connsiteX3" y="connsiteY3"/>
+                    </a:cxn>
+                    <a:cxn ang="0">
+                      <a:pos x="connsiteX4" y="connsiteY4"/>
+                    </a:cxn>
+                    <a:cxn ang="0">
+                      <a:pos x="connsiteX5" y="connsiteY5"/>
+                    </a:cxn>
+                    <a:cxn ang="0">
+                      <a:pos x="connsiteX6" y="connsiteY6"/>
+                    </a:cxn>
+                    <a:cxn ang="0">
+                      <a:pos x="connsiteX7" y="connsiteY7"/>
+                    </a:cxn>
+                  </a:cxnLst>
+                  <a:rect l="l" t="t" r="r" b="b"/>
+                  <a:pathLst>
+                    <a:path w="990600" h="1316689">
+                      <a:moveTo>
+                        <a:pt x="0" y="0"/>
+                      </a:moveTo>
+                      <a:cubicBezTo>
+                        <a:pt x="83079" y="578379"/>
+                        <a:pt x="166158" y="1156758"/>
+                        <a:pt x="215900" y="1295400"/>
+                      </a:cubicBezTo>
+                      <a:cubicBezTo>
+                        <a:pt x="265642" y="1434042"/>
+                        <a:pt x="262467" y="850900"/>
+                        <a:pt x="298450" y="831850"/>
+                      </a:cubicBezTo>
+                      <a:cubicBezTo>
+                        <a:pt x="334433" y="812800"/>
+                        <a:pt x="386292" y="1156758"/>
+                        <a:pt x="431800" y="1181100"/>
+                      </a:cubicBezTo>
+                      <a:cubicBezTo>
+                        <a:pt x="477308" y="1205442"/>
+                        <a:pt x="537633" y="985308"/>
+                        <a:pt x="571500" y="977900"/>
+                      </a:cubicBezTo>
+                      <a:cubicBezTo>
+                        <a:pt x="605367" y="970492"/>
+                        <a:pt x="590550" y="1125008"/>
+                        <a:pt x="635000" y="1136650"/>
+                      </a:cubicBezTo>
+                      <a:cubicBezTo>
+                        <a:pt x="679450" y="1148292"/>
+                        <a:pt x="778933" y="1056217"/>
+                        <a:pt x="838200" y="1047750"/>
+                      </a:cubicBezTo>
+                      <a:cubicBezTo>
+                        <a:pt x="897467" y="1039283"/>
+                        <a:pt x="944033" y="1062566"/>
+                        <a:pt x="990600" y="1085850"/>
+                      </a:cubicBezTo>
+                    </a:path>
+                  </a:pathLst>
+                </a:custGeom>
+                <a:noFill/>
+                <a:ln>
+                  <a:solidFill>
+                    <a:schemeClr val="tx1"/>
+                  </a:solidFill>
+                </a:ln>
+              </p:spPr>
+              <p:style>
+                <a:lnRef idx="2">
+                  <a:schemeClr val="accent1">
+                    <a:shade val="50000"/>
+                  </a:schemeClr>
+                </a:lnRef>
+                <a:fillRef idx="1">
+                  <a:schemeClr val="accent1"/>
+                </a:fillRef>
+                <a:effectRef idx="0">
+                  <a:schemeClr val="accent1"/>
+                </a:effectRef>
+                <a:fontRef idx="minor">
+                  <a:schemeClr val="lt1"/>
+                </a:fontRef>
+              </p:style>
+              <p:txBody>
+                <a:bodyPr rtlCol="0" anchor="ctr"/>
+                <a:lstStyle/>
+                <a:p>
+                  <a:pPr algn="ctr"/>
+                  <a:endParaRPr lang="en-GB"/>
+                </a:p>
+              </p:txBody>
+            </p:sp>
+            <p:sp>
+              <p:nvSpPr>
+                <p:cNvPr id="26" name="TextBox 25"/>
+                <p:cNvSpPr txBox="1"/>
+                <p:nvPr/>
+              </p:nvSpPr>
+              <p:spPr>
+                <a:xfrm>
+                  <a:off x="2293072" y="974681"/>
+                  <a:ext cx="340158" cy="369332"/>
+                </a:xfrm>
+                <a:prstGeom prst="rect">
+                  <a:avLst/>
+                </a:prstGeom>
+                <a:noFill/>
+              </p:spPr>
+              <p:txBody>
+                <a:bodyPr wrap="none" rtlCol="0">
+                  <a:spAutoFit/>
+                </a:bodyPr>
+                <a:lstStyle/>
+                <a:p>
+                  <a:r>
+                    <a:rPr lang="en-GB" dirty="0" smtClean="0">
+                      <a:latin typeface="Arial" panose="020B0604020202020204" pitchFamily="34" charset="0"/>
+                      <a:cs typeface="Arial" panose="020B0604020202020204" pitchFamily="34" charset="0"/>
+                    </a:rPr>
+                    <a:t>t</a:t>
+                  </a:r>
+                  <a:r>
+                    <a:rPr lang="en-GB" baseline="-25000" dirty="0" smtClean="0">
+                      <a:latin typeface="Arial" panose="020B0604020202020204" pitchFamily="34" charset="0"/>
+                      <a:cs typeface="Arial" panose="020B0604020202020204" pitchFamily="34" charset="0"/>
+                    </a:rPr>
+                    <a:t>1</a:t>
+                  </a:r>
+                  <a:endParaRPr lang="en-GB" baseline="-25000" dirty="0">
+                    <a:latin typeface="Arial" panose="020B0604020202020204" pitchFamily="34" charset="0"/>
+                    <a:cs typeface="Arial" panose="020B0604020202020204" pitchFamily="34" charset="0"/>
+                  </a:endParaRPr>
+                </a:p>
+              </p:txBody>
+            </p:sp>
+          </p:grpSp>
+          <p:sp>
+            <p:nvSpPr>
+              <p:cNvPr id="10" name="TextBox 9"/>
+              <p:cNvSpPr txBox="1"/>
+              <p:nvPr/>
+            </p:nvSpPr>
+            <p:spPr>
+              <a:xfrm>
+                <a:off x="1676049" y="715590"/>
+                <a:ext cx="436338" cy="338554"/>
+              </a:xfrm>
+              <a:prstGeom prst="rect">
+                <a:avLst/>
+              </a:prstGeom>
+              <a:noFill/>
+            </p:spPr>
+            <p:txBody>
+              <a:bodyPr wrap="none" rtlCol="0">
+                <a:spAutoFit/>
+              </a:bodyPr>
+              <a:lstStyle/>
+              <a:p>
+                <a:r>
+                  <a:rPr lang="en-GB" sz="1600" dirty="0" smtClean="0">
+                    <a:solidFill>
+                      <a:schemeClr val="accent1">
+                        <a:lumMod val="75000"/>
+                      </a:schemeClr>
+                    </a:solidFill>
+                    <a:latin typeface="Arial" panose="020B0604020202020204" pitchFamily="34" charset="0"/>
+                    <a:cs typeface="Arial" panose="020B0604020202020204" pitchFamily="34" charset="0"/>
+                  </a:rPr>
+                  <a:t>(1)</a:t>
+                </a:r>
+                <a:endParaRPr lang="en-GB" sz="1600" dirty="0">
+                  <a:solidFill>
+                    <a:schemeClr val="accent1">
+                      <a:lumMod val="75000"/>
+                    </a:schemeClr>
+                  </a:solidFill>
+                  <a:latin typeface="Arial" panose="020B0604020202020204" pitchFamily="34" charset="0"/>
+                  <a:cs typeface="Arial" panose="020B0604020202020204" pitchFamily="34" charset="0"/>
+                </a:endParaRPr>
+              </a:p>
+            </p:txBody>
+          </p:sp>
+          <p:sp>
+            <p:nvSpPr>
+              <p:cNvPr id="11" name="TextBox 10"/>
+              <p:cNvSpPr txBox="1"/>
+              <p:nvPr/>
+            </p:nvSpPr>
+            <p:spPr>
+              <a:xfrm>
+                <a:off x="1998829" y="713907"/>
+                <a:ext cx="474810" cy="338554"/>
+              </a:xfrm>
+              <a:prstGeom prst="rect">
+                <a:avLst/>
+              </a:prstGeom>
+              <a:noFill/>
+            </p:spPr>
+            <p:txBody>
+              <a:bodyPr wrap="none" rtlCol="0">
+                <a:spAutoFit/>
+              </a:bodyPr>
+              <a:lstStyle/>
+              <a:p>
+                <a:r>
+                  <a:rPr lang="en-GB" sz="1600" dirty="0" smtClean="0">
+                    <a:solidFill>
+                      <a:schemeClr val="accent1">
+                        <a:lumMod val="75000"/>
+                      </a:schemeClr>
+                    </a:solidFill>
+                    <a:latin typeface="Arial" panose="020B0604020202020204" pitchFamily="34" charset="0"/>
+                    <a:cs typeface="Arial" panose="020B0604020202020204" pitchFamily="34" charset="0"/>
+                  </a:rPr>
+                  <a:t>(1')</a:t>
+                </a:r>
+                <a:endParaRPr lang="en-GB" sz="1600" dirty="0">
+                  <a:solidFill>
+                    <a:schemeClr val="accent1">
+                      <a:lumMod val="75000"/>
+                    </a:schemeClr>
+                  </a:solidFill>
+                  <a:latin typeface="Arial" panose="020B0604020202020204" pitchFamily="34" charset="0"/>
+                  <a:cs typeface="Arial" panose="020B0604020202020204" pitchFamily="34" charset="0"/>
+                </a:endParaRPr>
+              </a:p>
+            </p:txBody>
+          </p:sp>
+          <p:sp>
+            <p:nvSpPr>
+              <p:cNvPr id="12" name="Rectangle 11"/>
+              <p:cNvSpPr/>
+              <p:nvPr/>
+            </p:nvSpPr>
+            <p:spPr>
+              <a:xfrm>
+                <a:off x="2507373" y="714395"/>
+                <a:ext cx="436338" cy="338554"/>
+              </a:xfrm>
+              <a:prstGeom prst="rect">
+                <a:avLst/>
+              </a:prstGeom>
+            </p:spPr>
+            <p:txBody>
+              <a:bodyPr wrap="none">
+                <a:spAutoFit/>
+              </a:bodyPr>
+              <a:lstStyle/>
+              <a:p>
+                <a:r>
+                  <a:rPr lang="en-GB" sz="1600" dirty="0" smtClean="0">
+                    <a:solidFill>
+                      <a:schemeClr val="accent1">
+                        <a:lumMod val="75000"/>
+                      </a:schemeClr>
+                    </a:solidFill>
+                    <a:latin typeface="Arial" panose="020B0604020202020204" pitchFamily="34" charset="0"/>
+                    <a:cs typeface="Arial" panose="020B0604020202020204" pitchFamily="34" charset="0"/>
+                  </a:rPr>
+                  <a:t>(2)</a:t>
+                </a:r>
+                <a:endParaRPr lang="en-GB" sz="1600" dirty="0">
+                  <a:solidFill>
+                    <a:schemeClr val="accent1">
+                      <a:lumMod val="75000"/>
+                    </a:schemeClr>
+                  </a:solidFill>
+                  <a:latin typeface="Arial" panose="020B0604020202020204" pitchFamily="34" charset="0"/>
+                  <a:cs typeface="Arial" panose="020B0604020202020204" pitchFamily="34" charset="0"/>
+                </a:endParaRPr>
+              </a:p>
+            </p:txBody>
+          </p:sp>
+          <p:sp>
+            <p:nvSpPr>
+              <p:cNvPr id="13" name="TextBox 12"/>
+              <p:cNvSpPr txBox="1"/>
+              <p:nvPr/>
+            </p:nvSpPr>
+            <p:spPr>
+              <a:xfrm>
+                <a:off x="2841061" y="717084"/>
+                <a:ext cx="474810" cy="338554"/>
+              </a:xfrm>
+              <a:prstGeom prst="rect">
+                <a:avLst/>
+              </a:prstGeom>
+              <a:noFill/>
+            </p:spPr>
+            <p:txBody>
+              <a:bodyPr wrap="none" rtlCol="0">
+                <a:spAutoFit/>
+              </a:bodyPr>
+              <a:lstStyle/>
+              <a:p>
+                <a:r>
+                  <a:rPr lang="en-GB" sz="1600" dirty="0" smtClean="0">
+                    <a:solidFill>
+                      <a:schemeClr val="accent1">
+                        <a:lumMod val="75000"/>
+                      </a:schemeClr>
+                    </a:solidFill>
+                    <a:latin typeface="Arial" panose="020B0604020202020204" pitchFamily="34" charset="0"/>
+                    <a:cs typeface="Arial" panose="020B0604020202020204" pitchFamily="34" charset="0"/>
+                  </a:rPr>
+                  <a:t>(2')</a:t>
+                </a:r>
+                <a:endParaRPr lang="en-GB" sz="1600" dirty="0">
+                  <a:solidFill>
+                    <a:schemeClr val="accent1">
+                      <a:lumMod val="75000"/>
+                    </a:schemeClr>
+                  </a:solidFill>
+                  <a:latin typeface="Arial" panose="020B0604020202020204" pitchFamily="34" charset="0"/>
+                  <a:cs typeface="Arial" panose="020B0604020202020204" pitchFamily="34" charset="0"/>
+                </a:endParaRPr>
+              </a:p>
+            </p:txBody>
+          </p:sp>
+          <p:sp>
+            <p:nvSpPr>
+              <p:cNvPr id="14" name="Rectangle 13"/>
+              <p:cNvSpPr/>
+              <p:nvPr/>
+            </p:nvSpPr>
+            <p:spPr>
+              <a:xfrm>
+                <a:off x="4586321" y="711218"/>
+                <a:ext cx="436338" cy="338554"/>
+              </a:xfrm>
+              <a:prstGeom prst="rect">
+                <a:avLst/>
+              </a:prstGeom>
+            </p:spPr>
+            <p:txBody>
+              <a:bodyPr wrap="none">
+                <a:spAutoFit/>
+              </a:bodyPr>
+              <a:lstStyle/>
+              <a:p>
+                <a:r>
+                  <a:rPr lang="en-GB" sz="1600" dirty="0" smtClean="0">
+                    <a:solidFill>
+                      <a:schemeClr val="accent1">
+                        <a:lumMod val="75000"/>
+                      </a:schemeClr>
+                    </a:solidFill>
+                    <a:latin typeface="Arial" panose="020B0604020202020204" pitchFamily="34" charset="0"/>
+                    <a:cs typeface="Arial" panose="020B0604020202020204" pitchFamily="34" charset="0"/>
+                  </a:rPr>
+                  <a:t>(3)</a:t>
+                </a:r>
+                <a:endParaRPr lang="en-GB" sz="1600" dirty="0">
+                  <a:solidFill>
+                    <a:schemeClr val="accent1">
+                      <a:lumMod val="75000"/>
+                    </a:schemeClr>
+                  </a:solidFill>
+                  <a:latin typeface="Arial" panose="020B0604020202020204" pitchFamily="34" charset="0"/>
+                  <a:cs typeface="Arial" panose="020B0604020202020204" pitchFamily="34" charset="0"/>
+                </a:endParaRPr>
+              </a:p>
+            </p:txBody>
+          </p:sp>
+          <p:sp>
+            <p:nvSpPr>
+              <p:cNvPr id="15" name="TextBox 14"/>
+              <p:cNvSpPr txBox="1"/>
+              <p:nvPr/>
+            </p:nvSpPr>
+            <p:spPr>
+              <a:xfrm>
+                <a:off x="4920009" y="713907"/>
+                <a:ext cx="474810" cy="338554"/>
+              </a:xfrm>
+              <a:prstGeom prst="rect">
+                <a:avLst/>
+              </a:prstGeom>
+              <a:noFill/>
+            </p:spPr>
+            <p:txBody>
+              <a:bodyPr wrap="none" rtlCol="0">
+                <a:spAutoFit/>
+              </a:bodyPr>
+              <a:lstStyle/>
+              <a:p>
+                <a:r>
+                  <a:rPr lang="en-GB" sz="1600" dirty="0" smtClean="0">
+                    <a:solidFill>
+                      <a:schemeClr val="accent1">
+                        <a:lumMod val="75000"/>
+                      </a:schemeClr>
+                    </a:solidFill>
+                    <a:latin typeface="Arial" panose="020B0604020202020204" pitchFamily="34" charset="0"/>
+                    <a:cs typeface="Arial" panose="020B0604020202020204" pitchFamily="34" charset="0"/>
+                  </a:rPr>
+                  <a:t>(3')</a:t>
+                </a:r>
+                <a:endParaRPr lang="en-GB" sz="1600" dirty="0">
+                  <a:solidFill>
+                    <a:schemeClr val="accent1">
+                      <a:lumMod val="75000"/>
+                    </a:schemeClr>
+                  </a:solidFill>
+                  <a:latin typeface="Arial" panose="020B0604020202020204" pitchFamily="34" charset="0"/>
+                  <a:cs typeface="Arial" panose="020B0604020202020204" pitchFamily="34" charset="0"/>
+                </a:endParaRPr>
+              </a:p>
+            </p:txBody>
+          </p:sp>
+          <p:sp>
+            <p:nvSpPr>
+              <p:cNvPr id="16" name="TextBox 15"/>
+              <p:cNvSpPr txBox="1"/>
+              <p:nvPr/>
+            </p:nvSpPr>
+            <p:spPr>
+              <a:xfrm>
+                <a:off x="5617481" y="1658463"/>
+                <a:ext cx="436338" cy="338554"/>
+              </a:xfrm>
+              <a:prstGeom prst="rect">
+                <a:avLst/>
+              </a:prstGeom>
+              <a:noFill/>
+            </p:spPr>
+            <p:txBody>
+              <a:bodyPr wrap="none" rtlCol="0">
+                <a:spAutoFit/>
+              </a:bodyPr>
+              <a:lstStyle/>
+              <a:p>
+                <a:r>
+                  <a:rPr lang="en-GB" sz="1600" dirty="0" smtClean="0">
+                    <a:solidFill>
+                      <a:schemeClr val="accent1">
+                        <a:lumMod val="75000"/>
+                      </a:schemeClr>
+                    </a:solidFill>
+                    <a:latin typeface="Arial" panose="020B0604020202020204" pitchFamily="34" charset="0"/>
+                    <a:cs typeface="Arial" panose="020B0604020202020204" pitchFamily="34" charset="0"/>
+                  </a:rPr>
+                  <a:t>(4)</a:t>
+                </a:r>
+                <a:endParaRPr lang="en-GB" sz="1600" dirty="0">
+                  <a:solidFill>
+                    <a:schemeClr val="accent1">
+                      <a:lumMod val="75000"/>
+                    </a:schemeClr>
+                  </a:solidFill>
+                  <a:latin typeface="Arial" panose="020B0604020202020204" pitchFamily="34" charset="0"/>
+                  <a:cs typeface="Arial" panose="020B0604020202020204" pitchFamily="34" charset="0"/>
+                </a:endParaRPr>
+              </a:p>
+            </p:txBody>
+          </p:sp>
+        </p:grpSp>
+      </p:grpSp>
+    </p:spTree>
+    <p:extLst>
+      <p:ext uri="{BB962C8B-B14F-4D97-AF65-F5344CB8AC3E}">
+        <p14:creationId xmlns:p14="http://schemas.microsoft.com/office/powerpoint/2010/main" val="3421472944"/>
+      </p:ext>
+    </p:extLst>
+  </p:cSld>
+  <p:clrMapOvr>
+    <a:masterClrMapping/>
+  </p:clrMapOvr>
+  <p:timing>
+    <p:tnLst>
+      <p:par>
+        <p:cTn id="1" dur="indefinite" restart="never" nodeType="tmRoot"/>
+      </p:par>
+    </p:tnLst>
+  </p:timing>
+</p:sld>
+</file>
+
+<file path=ppt/slides/slide57.xml><?xml version="1.0" encoding="utf-8"?>
 <p:sld xmlns:a="http://schemas.openxmlformats.org/drawingml/2006/main" xmlns:r="http://schemas.openxmlformats.org/officeDocument/2006/relationships" xmlns:p="http://schemas.openxmlformats.org/presentationml/2006/main">
   <p:cSld>
     <p:spTree>
@@ -45204,21 +46402,15 @@
           <p:nvPr/>
         </p:nvPicPr>
         <p:blipFill>
-          <a:blip r:embed="rId2" cstate="print">
-            <a:extLst>
-              <a:ext uri="{28A0092B-C50C-407E-A947-70E740481C1C}">
-                <a14:useLocalDpi xmlns:a14="http://schemas.microsoft.com/office/drawing/2010/main" val="0"/>
-              </a:ext>
-            </a:extLst>
-          </a:blip>
+          <a:blip r:embed="rId2"/>
           <a:stretch>
             <a:fillRect/>
           </a:stretch>
         </p:blipFill>
         <p:spPr>
           <a:xfrm>
-            <a:off x="3676454" y="932306"/>
-            <a:ext cx="5546076" cy="5113699"/>
+            <a:off x="1839133" y="384337"/>
+            <a:ext cx="7113559" cy="5792626"/>
           </a:xfrm>
           <a:prstGeom prst="rect">
             <a:avLst/>
@@ -45228,13 +46420,20 @@
     </p:spTree>
     <p:extLst>
       <p:ext uri="{BB962C8B-B14F-4D97-AF65-F5344CB8AC3E}">
-        <p14:creationId xmlns:p14="http://schemas.microsoft.com/office/powerpoint/2010/main" val="3421472944"/>
+        <p14:creationId xmlns:p14="http://schemas.microsoft.com/office/powerpoint/2010/main" val="1770417098"/>
       </p:ext>
     </p:extLst>
   </p:cSld>
   <p:clrMapOvr>
     <a:masterClrMapping/>
   </p:clrMapOvr>
+  <p:timing>
+    <p:tnLst>
+      <p:par>
+        <p:cTn id="1" dur="indefinite" restart="never" nodeType="tmRoot"/>
+      </p:par>
+    </p:tnLst>
+  </p:timing>
 </p:sld>
 </file>
 

</xml_diff>